<commit_message>
Agregado de inputs en el PPT
</commit_message>
<xml_diff>
--- a/PPT_Actividad 3.pptx
+++ b/PPT_Actividad 3.pptx
@@ -116,6 +116,11 @@
       </a:defRPr>
     </a:lvl9pPr>
   </p:defaultTextStyle>
+  <p:extLst>
+    <p:ext uri="{EFAFB233-063F-42B5-8137-9DF3F51BA10A}">
+      <p15:sldGuideLst xmlns:p15="http://schemas.microsoft.com/office/powerpoint/2012/main"/>
+    </p:ext>
+  </p:extLst>
 </p:presentation>
 </file>
 
@@ -450,7 +455,7 @@
           <a:p>
             <a:fld id="{59B34C83-1304-457C-8AF6-CCF490A005A4}" type="datetimeFigureOut">
               <a:rPr lang="es-ES" smtClean="0"/>
-              <a:t>02/06/2021</a:t>
+              <a:t>06/06/2021</a:t>
             </a:fld>
             <a:endParaRPr lang="es-ES"/>
           </a:p>
@@ -774,7 +779,7 @@
           <a:p>
             <a:fld id="{59B34C83-1304-457C-8AF6-CCF490A005A4}" type="datetimeFigureOut">
               <a:rPr lang="es-ES" smtClean="0"/>
-              <a:t>02/06/2021</a:t>
+              <a:t>06/06/2021</a:t>
             </a:fld>
             <a:endParaRPr lang="es-ES"/>
           </a:p>
@@ -1022,7 +1027,7 @@
           <a:p>
             <a:fld id="{59B34C83-1304-457C-8AF6-CCF490A005A4}" type="datetimeFigureOut">
               <a:rPr lang="es-ES" smtClean="0"/>
-              <a:t>02/06/2021</a:t>
+              <a:t>06/06/2021</a:t>
             </a:fld>
             <a:endParaRPr lang="es-ES"/>
           </a:p>
@@ -1361,7 +1366,7 @@
           <a:p>
             <a:fld id="{59B34C83-1304-457C-8AF6-CCF490A005A4}" type="datetimeFigureOut">
               <a:rPr lang="es-ES" smtClean="0"/>
-              <a:t>02/06/2021</a:t>
+              <a:t>06/06/2021</a:t>
             </a:fld>
             <a:endParaRPr lang="es-ES"/>
           </a:p>
@@ -1708,7 +1713,7 @@
           <a:p>
             <a:fld id="{59B34C83-1304-457C-8AF6-CCF490A005A4}" type="datetimeFigureOut">
               <a:rPr lang="es-ES" smtClean="0"/>
-              <a:t>02/06/2021</a:t>
+              <a:t>06/06/2021</a:t>
             </a:fld>
             <a:endParaRPr lang="es-ES"/>
           </a:p>
@@ -2082,7 +2087,7 @@
           <a:p>
             <a:fld id="{59B34C83-1304-457C-8AF6-CCF490A005A4}" type="datetimeFigureOut">
               <a:rPr lang="es-ES" smtClean="0"/>
-              <a:t>02/06/2021</a:t>
+              <a:t>06/06/2021</a:t>
             </a:fld>
             <a:endParaRPr lang="es-ES"/>
           </a:p>
@@ -2552,7 +2557,7 @@
           <a:p>
             <a:fld id="{59B34C83-1304-457C-8AF6-CCF490A005A4}" type="datetimeFigureOut">
               <a:rPr lang="es-ES" smtClean="0"/>
-              <a:t>02/06/2021</a:t>
+              <a:t>06/06/2021</a:t>
             </a:fld>
             <a:endParaRPr lang="es-ES"/>
           </a:p>
@@ -2757,7 +2762,7 @@
           <a:p>
             <a:fld id="{59B34C83-1304-457C-8AF6-CCF490A005A4}" type="datetimeFigureOut">
               <a:rPr lang="es-ES" smtClean="0"/>
-              <a:t>02/06/2021</a:t>
+              <a:t>06/06/2021</a:t>
             </a:fld>
             <a:endParaRPr lang="es-ES"/>
           </a:p>
@@ -2968,7 +2973,7 @@
           <a:p>
             <a:fld id="{59B34C83-1304-457C-8AF6-CCF490A005A4}" type="datetimeFigureOut">
               <a:rPr lang="es-ES" smtClean="0"/>
-              <a:t>02/06/2021</a:t>
+              <a:t>06/06/2021</a:t>
             </a:fld>
             <a:endParaRPr lang="es-ES"/>
           </a:p>
@@ -3200,7 +3205,7 @@
           <a:p>
             <a:fld id="{59B34C83-1304-457C-8AF6-CCF490A005A4}" type="datetimeFigureOut">
               <a:rPr lang="es-ES" smtClean="0"/>
-              <a:t>02/06/2021</a:t>
+              <a:t>06/06/2021</a:t>
             </a:fld>
             <a:endParaRPr lang="es-ES"/>
           </a:p>
@@ -3448,7 +3453,7 @@
           <a:p>
             <a:fld id="{59B34C83-1304-457C-8AF6-CCF490A005A4}" type="datetimeFigureOut">
               <a:rPr lang="es-ES" smtClean="0"/>
-              <a:t>02/06/2021</a:t>
+              <a:t>06/06/2021</a:t>
             </a:fld>
             <a:endParaRPr lang="es-ES"/>
           </a:p>
@@ -3746,7 +3751,7 @@
           <a:p>
             <a:fld id="{59B34C83-1304-457C-8AF6-CCF490A005A4}" type="datetimeFigureOut">
               <a:rPr lang="es-ES" smtClean="0"/>
-              <a:t>02/06/2021</a:t>
+              <a:t>06/06/2021</a:t>
             </a:fld>
             <a:endParaRPr lang="es-ES"/>
           </a:p>
@@ -4140,7 +4145,7 @@
           <a:p>
             <a:fld id="{59B34C83-1304-457C-8AF6-CCF490A005A4}" type="datetimeFigureOut">
               <a:rPr lang="es-ES" smtClean="0"/>
-              <a:t>02/06/2021</a:t>
+              <a:t>06/06/2021</a:t>
             </a:fld>
             <a:endParaRPr lang="es-ES"/>
           </a:p>
@@ -4289,7 +4294,7 @@
           <a:p>
             <a:fld id="{59B34C83-1304-457C-8AF6-CCF490A005A4}" type="datetimeFigureOut">
               <a:rPr lang="es-ES" smtClean="0"/>
-              <a:t>02/06/2021</a:t>
+              <a:t>06/06/2021</a:t>
             </a:fld>
             <a:endParaRPr lang="es-ES"/>
           </a:p>
@@ -4415,7 +4420,7 @@
           <a:p>
             <a:fld id="{59B34C83-1304-457C-8AF6-CCF490A005A4}" type="datetimeFigureOut">
               <a:rPr lang="es-ES" smtClean="0"/>
-              <a:t>02/06/2021</a:t>
+              <a:t>06/06/2021</a:t>
             </a:fld>
             <a:endParaRPr lang="es-ES"/>
           </a:p>
@@ -4670,7 +4675,7 @@
           <a:p>
             <a:fld id="{59B34C83-1304-457C-8AF6-CCF490A005A4}" type="datetimeFigureOut">
               <a:rPr lang="es-ES" smtClean="0"/>
-              <a:t>02/06/2021</a:t>
+              <a:t>06/06/2021</a:t>
             </a:fld>
             <a:endParaRPr lang="es-ES"/>
           </a:p>
@@ -4985,7 +4990,7 @@
           <a:p>
             <a:fld id="{59B34C83-1304-457C-8AF6-CCF490A005A4}" type="datetimeFigureOut">
               <a:rPr lang="es-ES" smtClean="0"/>
-              <a:t>02/06/2021</a:t>
+              <a:t>06/06/2021</a:t>
             </a:fld>
             <a:endParaRPr lang="es-ES"/>
           </a:p>
@@ -5336,7 +5341,7 @@
           <a:p>
             <a:fld id="{59B34C83-1304-457C-8AF6-CCF490A005A4}" type="datetimeFigureOut">
               <a:rPr lang="es-ES" smtClean="0"/>
-              <a:t>02/06/2021</a:t>
+              <a:t>06/06/2021</a:t>
             </a:fld>
             <a:endParaRPr lang="es-ES"/>
           </a:p>
@@ -6460,6 +6465,24 @@
           <a:bodyPr/>
           <a:lstStyle/>
           <a:p>
+            <a:r>
+              <a:rPr lang="es-AR" dirty="0"/>
+              <a:t>Método de entrada (inputType) para el elemento EditText, llamado textPersonName. </a:t>
+            </a:r>
+          </a:p>
+          <a:p>
+            <a:r>
+              <a:rPr lang="es-AR" dirty="0"/>
+              <a:t>Con este input se nos permite ingresar solo una línea de texto (no nos aparece el enter para bajar de línea) y no se activa el auto corrector.</a:t>
+            </a:r>
+          </a:p>
+          <a:p>
+            <a:r>
+              <a:rPr lang="es-AR" dirty="0"/>
+              <a:t>También nos muestra sugerencias si tenemos guardado un nombre en el teléfono.</a:t>
+            </a:r>
+          </a:p>
+          <a:p>
             <a:endParaRPr lang="es-ES" dirty="0"/>
           </a:p>
         </p:txBody>
@@ -6543,6 +6566,24 @@
           <a:bodyPr/>
           <a:lstStyle/>
           <a:p>
+            <a:r>
+              <a:rPr lang="es-AR" dirty="0"/>
+              <a:t>Método de entrada (inputType) para el elemento EditText, llamado textEmailAddress.</a:t>
+            </a:r>
+          </a:p>
+          <a:p>
+            <a:r>
+              <a:rPr lang="es-AR" dirty="0"/>
+              <a:t> Permite ingresar una dirección de email. El teclado nos proporciona el “@” y una tecla para agregar “.com”</a:t>
+            </a:r>
+          </a:p>
+          <a:p>
+            <a:r>
+              <a:rPr lang="es-AR" dirty="0"/>
+              <a:t>También nos muestra sugerencias con los emails que hayamos ingresado en el teléfono.</a:t>
+            </a:r>
+          </a:p>
+          <a:p>
             <a:endParaRPr lang="es-ES" dirty="0"/>
           </a:p>
         </p:txBody>
@@ -6626,7 +6667,22 @@
           <a:bodyPr/>
           <a:lstStyle/>
           <a:p>
-            <a:endParaRPr lang="es-ES" dirty="0"/>
+            <a:r>
+              <a:rPr lang="es-AR" dirty="0"/>
+              <a:t>Método de entrada (inputType) para el elemento EditText, llamado phone. </a:t>
+            </a:r>
+          </a:p>
+          <a:p>
+            <a:r>
+              <a:rPr lang="es-ES" dirty="0"/>
+              <a:t>Nos permite ingresar un numero de teléfono. Se muestra en pantalla un teclado numérico con las respectivas letras acompañadas por cada numero además del “*” y “#”.</a:t>
+            </a:r>
+          </a:p>
+          <a:p>
+            <a:r>
+              <a:rPr lang="es-ES" dirty="0"/>
+              <a:t>Nos muestra como sugerencia nuestro numero de teléfono.</a:t>
+            </a:r>
           </a:p>
         </p:txBody>
       </p:sp>
@@ -6708,6 +6764,21 @@
         <p:txBody>
           <a:bodyPr/>
           <a:lstStyle/>
+          <a:p>
+            <a:r>
+              <a:rPr lang="es-AR" dirty="0"/>
+              <a:t>Método de entrada (inputType) para el elemento EditText, llamado textPostalAddress.</a:t>
+            </a:r>
+          </a:p>
+          <a:p>
+            <a:r>
+              <a:rPr lang="es-AR" dirty="0"/>
+              <a:t> Nos permite ingresar una dirección. El teclado muestra tanto letras como números.</a:t>
+            </a:r>
+          </a:p>
+          <a:p>
+            <a:endParaRPr lang="es-AR" dirty="0"/>
+          </a:p>
           <a:p>
             <a:endParaRPr lang="es-ES" dirty="0"/>
           </a:p>

</xml_diff>